<commit_message>
Improved concurrent queue test program
</commit_message>
<xml_diff>
--- a/paper/MS.pptx
+++ b/paper/MS.pptx
@@ -2968,36 +2968,6 @@
       </p:grpSpPr>
       <p:pic>
         <p:nvPicPr>
-          <p:cNvPr id="6" name="Picture 5">
-            <a:extLst>
-              <a:ext uri="{FF2B5EF4-FFF2-40B4-BE49-F238E27FC236}">
-                <a16:creationId xmlns:a16="http://schemas.microsoft.com/office/drawing/2014/main" id="{1A882457-9059-BC4F-8228-BAC69F7B3599}"/>
-              </a:ext>
-            </a:extLst>
-          </p:cNvPr>
-          <p:cNvPicPr>
-            <a:picLocks noChangeAspect="1"/>
-          </p:cNvPicPr>
-          <p:nvPr/>
-        </p:nvPicPr>
-        <p:blipFill>
-          <a:blip r:embed="rId2"/>
-          <a:stretch>
-            <a:fillRect/>
-          </a:stretch>
-        </p:blipFill>
-        <p:spPr>
-          <a:xfrm>
-            <a:off x="267277" y="423141"/>
-            <a:ext cx="5270500" cy="317500"/>
-          </a:xfrm>
-          <a:prstGeom prst="rect">
-            <a:avLst/>
-          </a:prstGeom>
-        </p:spPr>
-      </p:pic>
-      <p:pic>
-        <p:nvPicPr>
           <p:cNvPr id="7" name="Picture 6">
             <a:extLst>
               <a:ext uri="{FF2B5EF4-FFF2-40B4-BE49-F238E27FC236}">
@@ -3011,7 +2981,7 @@
           <p:nvPr/>
         </p:nvPicPr>
         <p:blipFill>
-          <a:blip r:embed="rId3"/>
+          <a:blip r:embed="rId2"/>
           <a:stretch>
             <a:fillRect/>
           </a:stretch>
@@ -3041,7 +3011,7 @@
           <p:nvPr/>
         </p:nvPicPr>
         <p:blipFill>
-          <a:blip r:embed="rId4"/>
+          <a:blip r:embed="rId3"/>
           <a:stretch>
             <a:fillRect/>
           </a:stretch>
@@ -3258,6 +3228,66 @@
           </a:p>
         </p:txBody>
       </p:sp>
+      <p:pic>
+        <p:nvPicPr>
+          <p:cNvPr id="15" name="Picture 14">
+            <a:extLst>
+              <a:ext uri="{FF2B5EF4-FFF2-40B4-BE49-F238E27FC236}">
+                <a16:creationId xmlns:a16="http://schemas.microsoft.com/office/drawing/2014/main" id="{03C612D6-92CE-B64C-8446-D202CD8EF0A0}"/>
+              </a:ext>
+            </a:extLst>
+          </p:cNvPr>
+          <p:cNvPicPr>
+            <a:picLocks noChangeAspect="1"/>
+          </p:cNvPicPr>
+          <p:nvPr/>
+        </p:nvPicPr>
+        <p:blipFill>
+          <a:blip r:embed="rId4"/>
+          <a:stretch>
+            <a:fillRect/>
+          </a:stretch>
+        </p:blipFill>
+        <p:spPr>
+          <a:xfrm>
+            <a:off x="285173" y="490164"/>
+            <a:ext cx="863600" cy="279400"/>
+          </a:xfrm>
+          <a:prstGeom prst="rect">
+            <a:avLst/>
+          </a:prstGeom>
+        </p:spPr>
+      </p:pic>
+      <p:pic>
+        <p:nvPicPr>
+          <p:cNvPr id="16" name="Picture 15">
+            <a:extLst>
+              <a:ext uri="{FF2B5EF4-FFF2-40B4-BE49-F238E27FC236}">
+                <a16:creationId xmlns:a16="http://schemas.microsoft.com/office/drawing/2014/main" id="{C89EE123-76E5-E447-960F-DA981C04D196}"/>
+              </a:ext>
+            </a:extLst>
+          </p:cNvPr>
+          <p:cNvPicPr>
+            <a:picLocks noChangeAspect="1"/>
+          </p:cNvPicPr>
+          <p:nvPr/>
+        </p:nvPicPr>
+        <p:blipFill>
+          <a:blip r:embed="rId5"/>
+          <a:stretch>
+            <a:fillRect/>
+          </a:stretch>
+        </p:blipFill>
+        <p:spPr>
+          <a:xfrm>
+            <a:off x="1148773" y="483175"/>
+            <a:ext cx="4076700" cy="304800"/>
+          </a:xfrm>
+          <a:prstGeom prst="rect">
+            <a:avLst/>
+          </a:prstGeom>
+        </p:spPr>
+      </p:pic>
     </p:spTree>
     <p:extLst>
       <p:ext uri="{BB962C8B-B14F-4D97-AF65-F5344CB8AC3E}">

</xml_diff>